<commit_message>
update to resource page
</commit_message>
<xml_diff>
--- a/Resources/SAS_Portal.pptx
+++ b/Resources/SAS_Portal.pptx
@@ -2959,6 +2959,28 @@
 <file path=ppt/slides/slide1.xml><?xml version="1.0" encoding="utf-8"?>
 <p:sld xmlns:a="http://schemas.openxmlformats.org/drawingml/2006/main" xmlns:r="http://schemas.openxmlformats.org/officeDocument/2006/relationships" xmlns:p="http://schemas.openxmlformats.org/presentationml/2006/main">
   <p:cSld>
+    <p:bg>
+      <p:bgPr>
+        <a:gradFill>
+          <a:gsLst>
+            <a:gs pos="32000">
+              <a:schemeClr val="bg1"/>
+            </a:gs>
+            <a:gs pos="61000">
+              <a:srgbClr val="45F71A"/>
+            </a:gs>
+            <a:gs pos="100000">
+              <a:srgbClr val="46D5ED"/>
+            </a:gs>
+            <a:gs pos="89000">
+              <a:srgbClr val="45FBEC"/>
+            </a:gs>
+          </a:gsLst>
+          <a:lin ang="5400000" scaled="1"/>
+        </a:gradFill>
+        <a:effectLst/>
+      </p:bgPr>
+    </p:bg>
     <p:spTree>
       <p:nvGrpSpPr>
         <p:cNvPr id="1" name=""/>

</xml_diff>